<commit_message>
add Doji candlestick pattern
</commit_message>
<xml_diff>
--- a/docs/.offline/Candlestick Patterns.pptx
+++ b/docs/.offline/Candlestick Patterns.pptx
@@ -6,6 +6,7 @@
   </p:sldMasterIdLst>
   <p:sldIdLst>
     <p:sldId id="256" r:id="rId2"/>
+    <p:sldId id="257" r:id="rId3"/>
   </p:sldIdLst>
   <p:sldSz cx="12192000" cy="6858000"/>
   <p:notesSz cx="6858000" cy="9144000"/>
@@ -104,6 +105,11 @@
       </a:defRPr>
     </a:lvl9pPr>
   </p:defaultTextStyle>
+  <p:extLst>
+    <p:ext uri="{EFAFB233-063F-42B5-8137-9DF3F51BA10A}">
+      <p15:sldGuideLst xmlns:p15="http://schemas.microsoft.com/office/powerpoint/2012/main"/>
+    </p:ext>
+  </p:extLst>
 </p:presentation>
 </file>
 
@@ -254,7 +260,7 @@
           <a:p>
             <a:fld id="{39841380-F30E-4851-871C-127732E5EC44}" type="datetimeFigureOut">
               <a:rPr lang="en-US" smtClean="0"/>
-              <a:t>8/8/2021</a:t>
+              <a:t>3/5/2022</a:t>
             </a:fld>
             <a:endParaRPr lang="en-US"/>
           </a:p>
@@ -452,7 +458,7 @@
           <a:p>
             <a:fld id="{39841380-F30E-4851-871C-127732E5EC44}" type="datetimeFigureOut">
               <a:rPr lang="en-US" smtClean="0"/>
-              <a:t>8/8/2021</a:t>
+              <a:t>3/5/2022</a:t>
             </a:fld>
             <a:endParaRPr lang="en-US"/>
           </a:p>
@@ -660,7 +666,7 @@
           <a:p>
             <a:fld id="{39841380-F30E-4851-871C-127732E5EC44}" type="datetimeFigureOut">
               <a:rPr lang="en-US" smtClean="0"/>
-              <a:t>8/8/2021</a:t>
+              <a:t>3/5/2022</a:t>
             </a:fld>
             <a:endParaRPr lang="en-US"/>
           </a:p>
@@ -858,7 +864,7 @@
           <a:p>
             <a:fld id="{39841380-F30E-4851-871C-127732E5EC44}" type="datetimeFigureOut">
               <a:rPr lang="en-US" smtClean="0"/>
-              <a:t>8/8/2021</a:t>
+              <a:t>3/5/2022</a:t>
             </a:fld>
             <a:endParaRPr lang="en-US"/>
           </a:p>
@@ -1133,7 +1139,7 @@
           <a:p>
             <a:fld id="{39841380-F30E-4851-871C-127732E5EC44}" type="datetimeFigureOut">
               <a:rPr lang="en-US" smtClean="0"/>
-              <a:t>8/8/2021</a:t>
+              <a:t>3/5/2022</a:t>
             </a:fld>
             <a:endParaRPr lang="en-US"/>
           </a:p>
@@ -1398,7 +1404,7 @@
           <a:p>
             <a:fld id="{39841380-F30E-4851-871C-127732E5EC44}" type="datetimeFigureOut">
               <a:rPr lang="en-US" smtClean="0"/>
-              <a:t>8/8/2021</a:t>
+              <a:t>3/5/2022</a:t>
             </a:fld>
             <a:endParaRPr lang="en-US"/>
           </a:p>
@@ -1810,7 +1816,7 @@
           <a:p>
             <a:fld id="{39841380-F30E-4851-871C-127732E5EC44}" type="datetimeFigureOut">
               <a:rPr lang="en-US" smtClean="0"/>
-              <a:t>8/8/2021</a:t>
+              <a:t>3/5/2022</a:t>
             </a:fld>
             <a:endParaRPr lang="en-US"/>
           </a:p>
@@ -1951,7 +1957,7 @@
           <a:p>
             <a:fld id="{39841380-F30E-4851-871C-127732E5EC44}" type="datetimeFigureOut">
               <a:rPr lang="en-US" smtClean="0"/>
-              <a:t>8/8/2021</a:t>
+              <a:t>3/5/2022</a:t>
             </a:fld>
             <a:endParaRPr lang="en-US"/>
           </a:p>
@@ -2064,7 +2070,7 @@
           <a:p>
             <a:fld id="{39841380-F30E-4851-871C-127732E5EC44}" type="datetimeFigureOut">
               <a:rPr lang="en-US" smtClean="0"/>
-              <a:t>8/8/2021</a:t>
+              <a:t>3/5/2022</a:t>
             </a:fld>
             <a:endParaRPr lang="en-US"/>
           </a:p>
@@ -2375,7 +2381,7 @@
           <a:p>
             <a:fld id="{39841380-F30E-4851-871C-127732E5EC44}" type="datetimeFigureOut">
               <a:rPr lang="en-US" smtClean="0"/>
-              <a:t>8/8/2021</a:t>
+              <a:t>3/5/2022</a:t>
             </a:fld>
             <a:endParaRPr lang="en-US"/>
           </a:p>
@@ -2663,7 +2669,7 @@
           <a:p>
             <a:fld id="{39841380-F30E-4851-871C-127732E5EC44}" type="datetimeFigureOut">
               <a:rPr lang="en-US" smtClean="0"/>
-              <a:t>8/8/2021</a:t>
+              <a:t>3/5/2022</a:t>
             </a:fld>
             <a:endParaRPr lang="en-US"/>
           </a:p>
@@ -2904,7 +2910,7 @@
           <a:p>
             <a:fld id="{39841380-F30E-4851-871C-127732E5EC44}" type="datetimeFigureOut">
               <a:rPr lang="en-US" smtClean="0"/>
-              <a:t>8/8/2021</a:t>
+              <a:t>3/5/2022</a:t>
             </a:fld>
             <a:endParaRPr lang="en-US"/>
           </a:p>
@@ -3625,6 +3631,328 @@
 </p:sld>
 </file>
 
+<file path=ppt/slides/slide2.xml><?xml version="1.0" encoding="utf-8"?>
+<p:sld xmlns:a="http://schemas.openxmlformats.org/drawingml/2006/main" xmlns:r="http://schemas.openxmlformats.org/officeDocument/2006/relationships" xmlns:p="http://schemas.openxmlformats.org/presentationml/2006/main">
+  <p:cSld>
+    <p:spTree>
+      <p:nvGrpSpPr>
+        <p:cNvPr id="1" name=""/>
+        <p:cNvGrpSpPr/>
+        <p:nvPr/>
+      </p:nvGrpSpPr>
+      <p:grpSpPr>
+        <a:xfrm>
+          <a:off x="0" y="0"/>
+          <a:ext cx="0" cy="0"/>
+          <a:chOff x="0" y="0"/>
+          <a:chExt cx="0" cy="0"/>
+        </a:xfrm>
+      </p:grpSpPr>
+      <p:sp>
+        <p:nvSpPr>
+          <p:cNvPr id="4" name="Title 3">
+            <a:extLst>
+              <a:ext uri="{FF2B5EF4-FFF2-40B4-BE49-F238E27FC236}">
+                <a16:creationId xmlns:a16="http://schemas.microsoft.com/office/drawing/2014/main" id="{34163318-EFB7-4954-947F-FE5D2EBF5834}"/>
+              </a:ext>
+            </a:extLst>
+          </p:cNvPr>
+          <p:cNvSpPr>
+            <a:spLocks noGrp="1"/>
+          </p:cNvSpPr>
+          <p:nvPr>
+            <p:ph type="title"/>
+          </p:nvPr>
+        </p:nvSpPr>
+        <p:spPr/>
+        <p:txBody>
+          <a:bodyPr/>
+          <a:lstStyle/>
+          <a:p>
+            <a:r>
+              <a:rPr lang="en-US" dirty="0"/>
+              <a:t>Doji</a:t>
+            </a:r>
+          </a:p>
+        </p:txBody>
+      </p:sp>
+      <p:cxnSp>
+        <p:nvCxnSpPr>
+          <p:cNvPr id="6" name="Straight Connector 5">
+            <a:extLst>
+              <a:ext uri="{FF2B5EF4-FFF2-40B4-BE49-F238E27FC236}">
+                <a16:creationId xmlns:a16="http://schemas.microsoft.com/office/drawing/2014/main" id="{143DDC87-F100-4342-82B8-65DE1CD6C7CE}"/>
+              </a:ext>
+            </a:extLst>
+          </p:cNvPr>
+          <p:cNvCxnSpPr>
+            <a:cxnSpLocks/>
+          </p:cNvCxnSpPr>
+          <p:nvPr/>
+        </p:nvCxnSpPr>
+        <p:spPr>
+          <a:xfrm>
+            <a:off x="4800600" y="3148642"/>
+            <a:ext cx="0" cy="1017916"/>
+          </a:xfrm>
+          <a:prstGeom prst="line">
+            <a:avLst/>
+          </a:prstGeom>
+          <a:ln w="57150">
+            <a:solidFill>
+              <a:schemeClr val="accent6">
+                <a:lumMod val="75000"/>
+              </a:schemeClr>
+            </a:solidFill>
+          </a:ln>
+        </p:spPr>
+        <p:style>
+          <a:lnRef idx="1">
+            <a:schemeClr val="accent1"/>
+          </a:lnRef>
+          <a:fillRef idx="0">
+            <a:schemeClr val="accent1"/>
+          </a:fillRef>
+          <a:effectRef idx="0">
+            <a:schemeClr val="accent1"/>
+          </a:effectRef>
+          <a:fontRef idx="minor">
+            <a:schemeClr val="tx1"/>
+          </a:fontRef>
+        </p:style>
+      </p:cxnSp>
+      <p:sp>
+        <p:nvSpPr>
+          <p:cNvPr id="7" name="Rectangle 6">
+            <a:extLst>
+              <a:ext uri="{FF2B5EF4-FFF2-40B4-BE49-F238E27FC236}">
+                <a16:creationId xmlns:a16="http://schemas.microsoft.com/office/drawing/2014/main" id="{CA51E41A-1AC7-4DDF-A19F-AB43646240B7}"/>
+              </a:ext>
+            </a:extLst>
+          </p:cNvPr>
+          <p:cNvSpPr/>
+          <p:nvPr/>
+        </p:nvSpPr>
+        <p:spPr>
+          <a:xfrm>
+            <a:off x="4572000" y="3657916"/>
+            <a:ext cx="457200" cy="45719"/>
+          </a:xfrm>
+          <a:prstGeom prst="rect">
+            <a:avLst/>
+          </a:prstGeom>
+          <a:solidFill>
+            <a:schemeClr val="accent6">
+              <a:lumMod val="75000"/>
+            </a:schemeClr>
+          </a:solidFill>
+          <a:ln>
+            <a:noFill/>
+          </a:ln>
+        </p:spPr>
+        <p:style>
+          <a:lnRef idx="2">
+            <a:schemeClr val="accent1">
+              <a:shade val="50000"/>
+            </a:schemeClr>
+          </a:lnRef>
+          <a:fillRef idx="1">
+            <a:schemeClr val="accent1"/>
+          </a:fillRef>
+          <a:effectRef idx="0">
+            <a:schemeClr val="accent1"/>
+          </a:effectRef>
+          <a:fontRef idx="minor">
+            <a:schemeClr val="lt1"/>
+          </a:fontRef>
+        </p:style>
+        <p:txBody>
+          <a:bodyPr rtlCol="0" anchor="ctr"/>
+          <a:lstStyle/>
+          <a:p>
+            <a:pPr algn="ctr"/>
+            <a:endParaRPr lang="en-US"/>
+          </a:p>
+        </p:txBody>
+      </p:sp>
+      <p:cxnSp>
+        <p:nvCxnSpPr>
+          <p:cNvPr id="8" name="Straight Connector 7">
+            <a:extLst>
+              <a:ext uri="{FF2B5EF4-FFF2-40B4-BE49-F238E27FC236}">
+                <a16:creationId xmlns:a16="http://schemas.microsoft.com/office/drawing/2014/main" id="{931BF6D4-E8A8-47AA-A128-F3318BFCE8A4}"/>
+              </a:ext>
+            </a:extLst>
+          </p:cNvPr>
+          <p:cNvCxnSpPr/>
+          <p:nvPr/>
+        </p:nvCxnSpPr>
+        <p:spPr>
+          <a:xfrm>
+            <a:off x="6172200" y="2286000"/>
+            <a:ext cx="0" cy="2743200"/>
+          </a:xfrm>
+          <a:prstGeom prst="line">
+            <a:avLst/>
+          </a:prstGeom>
+          <a:ln w="57150">
+            <a:solidFill>
+              <a:srgbClr val="C00000"/>
+            </a:solidFill>
+          </a:ln>
+        </p:spPr>
+        <p:style>
+          <a:lnRef idx="1">
+            <a:schemeClr val="accent1"/>
+          </a:lnRef>
+          <a:fillRef idx="0">
+            <a:schemeClr val="accent1"/>
+          </a:fillRef>
+          <a:effectRef idx="0">
+            <a:schemeClr val="accent1"/>
+          </a:effectRef>
+          <a:fontRef idx="minor">
+            <a:schemeClr val="tx1"/>
+          </a:fontRef>
+        </p:style>
+      </p:cxnSp>
+      <p:sp>
+        <p:nvSpPr>
+          <p:cNvPr id="9" name="Rectangle 8">
+            <a:extLst>
+              <a:ext uri="{FF2B5EF4-FFF2-40B4-BE49-F238E27FC236}">
+                <a16:creationId xmlns:a16="http://schemas.microsoft.com/office/drawing/2014/main" id="{36339A97-5DA3-4B05-8BB7-4CDCB3942D6B}"/>
+              </a:ext>
+            </a:extLst>
+          </p:cNvPr>
+          <p:cNvSpPr/>
+          <p:nvPr/>
+        </p:nvSpPr>
+        <p:spPr>
+          <a:xfrm>
+            <a:off x="5943600" y="3657916"/>
+            <a:ext cx="457200" cy="45720"/>
+          </a:xfrm>
+          <a:prstGeom prst="rect">
+            <a:avLst/>
+          </a:prstGeom>
+          <a:solidFill>
+            <a:srgbClr val="C00000"/>
+          </a:solidFill>
+          <a:ln>
+            <a:noFill/>
+          </a:ln>
+        </p:spPr>
+        <p:style>
+          <a:lnRef idx="2">
+            <a:schemeClr val="accent1">
+              <a:shade val="50000"/>
+            </a:schemeClr>
+          </a:lnRef>
+          <a:fillRef idx="1">
+            <a:schemeClr val="accent1"/>
+          </a:fillRef>
+          <a:effectRef idx="0">
+            <a:schemeClr val="accent1"/>
+          </a:effectRef>
+          <a:fontRef idx="minor">
+            <a:schemeClr val="lt1"/>
+          </a:fontRef>
+        </p:style>
+        <p:txBody>
+          <a:bodyPr rtlCol="0" anchor="ctr"/>
+          <a:lstStyle/>
+          <a:p>
+            <a:pPr algn="ctr"/>
+            <a:endParaRPr lang="en-US"/>
+          </a:p>
+        </p:txBody>
+      </p:sp>
+      <p:sp>
+        <p:nvSpPr>
+          <p:cNvPr id="10" name="TextBox 9">
+            <a:extLst>
+              <a:ext uri="{FF2B5EF4-FFF2-40B4-BE49-F238E27FC236}">
+                <a16:creationId xmlns:a16="http://schemas.microsoft.com/office/drawing/2014/main" id="{ED062664-9A3D-4B37-9BBF-5F9043914BB6}"/>
+              </a:ext>
+            </a:extLst>
+          </p:cNvPr>
+          <p:cNvSpPr txBox="1"/>
+          <p:nvPr/>
+        </p:nvSpPr>
+        <p:spPr>
+          <a:xfrm>
+            <a:off x="4343400" y="4262818"/>
+            <a:ext cx="914400" cy="276999"/>
+          </a:xfrm>
+          <a:prstGeom prst="rect">
+            <a:avLst/>
+          </a:prstGeom>
+          <a:noFill/>
+        </p:spPr>
+        <p:txBody>
+          <a:bodyPr wrap="square" lIns="0" tIns="0" rIns="0" bIns="0" rtlCol="0">
+            <a:spAutoFit/>
+          </a:bodyPr>
+          <a:lstStyle/>
+          <a:p>
+            <a:pPr algn="ctr"/>
+            <a:r>
+              <a:rPr lang="en-US" dirty="0"/>
+              <a:t>Doji</a:t>
+            </a:r>
+          </a:p>
+        </p:txBody>
+      </p:sp>
+      <p:sp>
+        <p:nvSpPr>
+          <p:cNvPr id="11" name="TextBox 10">
+            <a:extLst>
+              <a:ext uri="{FF2B5EF4-FFF2-40B4-BE49-F238E27FC236}">
+                <a16:creationId xmlns:a16="http://schemas.microsoft.com/office/drawing/2014/main" id="{07F457D0-F438-4D3D-BAC8-691D6AB68E1A}"/>
+              </a:ext>
+            </a:extLst>
+          </p:cNvPr>
+          <p:cNvSpPr txBox="1"/>
+          <p:nvPr/>
+        </p:nvSpPr>
+        <p:spPr>
+          <a:xfrm>
+            <a:off x="5557838" y="5204073"/>
+            <a:ext cx="1228723" cy="276999"/>
+          </a:xfrm>
+          <a:prstGeom prst="rect">
+            <a:avLst/>
+          </a:prstGeom>
+          <a:noFill/>
+        </p:spPr>
+        <p:txBody>
+          <a:bodyPr wrap="square" lIns="0" tIns="0" rIns="0" bIns="0" rtlCol="0">
+            <a:spAutoFit/>
+          </a:bodyPr>
+          <a:lstStyle/>
+          <a:p>
+            <a:pPr algn="ctr"/>
+            <a:r>
+              <a:rPr lang="en-US" dirty="0"/>
+              <a:t>Long-legged</a:t>
+            </a:r>
+          </a:p>
+        </p:txBody>
+      </p:sp>
+    </p:spTree>
+    <p:extLst>
+      <p:ext uri="{BB962C8B-B14F-4D97-AF65-F5344CB8AC3E}">
+        <p14:creationId xmlns:p14="http://schemas.microsoft.com/office/powerpoint/2010/main" val="152903823"/>
+      </p:ext>
+    </p:extLst>
+  </p:cSld>
+  <p:clrMapOvr>
+    <a:masterClrMapping/>
+  </p:clrMapOvr>
+</p:sld>
+</file>
+
 <file path=ppt/theme/theme1.xml><?xml version="1.0" encoding="utf-8"?>
 <a:theme xmlns:a="http://schemas.openxmlformats.org/drawingml/2006/main" name="Office Theme">
   <a:themeElements>

</xml_diff>

<commit_message>
add Doji candlestick pattern (#735)
</commit_message>
<xml_diff>
--- a/docs/.offline/Candlestick Patterns.pptx
+++ b/docs/.offline/Candlestick Patterns.pptx
@@ -6,6 +6,7 @@
   </p:sldMasterIdLst>
   <p:sldIdLst>
     <p:sldId id="256" r:id="rId2"/>
+    <p:sldId id="257" r:id="rId3"/>
   </p:sldIdLst>
   <p:sldSz cx="12192000" cy="6858000"/>
   <p:notesSz cx="6858000" cy="9144000"/>
@@ -104,6 +105,11 @@
       </a:defRPr>
     </a:lvl9pPr>
   </p:defaultTextStyle>
+  <p:extLst>
+    <p:ext uri="{EFAFB233-063F-42B5-8137-9DF3F51BA10A}">
+      <p15:sldGuideLst xmlns:p15="http://schemas.microsoft.com/office/powerpoint/2012/main"/>
+    </p:ext>
+  </p:extLst>
 </p:presentation>
 </file>
 
@@ -254,7 +260,7 @@
           <a:p>
             <a:fld id="{39841380-F30E-4851-871C-127732E5EC44}" type="datetimeFigureOut">
               <a:rPr lang="en-US" smtClean="0"/>
-              <a:t>8/8/2021</a:t>
+              <a:t>3/5/2022</a:t>
             </a:fld>
             <a:endParaRPr lang="en-US"/>
           </a:p>
@@ -452,7 +458,7 @@
           <a:p>
             <a:fld id="{39841380-F30E-4851-871C-127732E5EC44}" type="datetimeFigureOut">
               <a:rPr lang="en-US" smtClean="0"/>
-              <a:t>8/8/2021</a:t>
+              <a:t>3/5/2022</a:t>
             </a:fld>
             <a:endParaRPr lang="en-US"/>
           </a:p>
@@ -660,7 +666,7 @@
           <a:p>
             <a:fld id="{39841380-F30E-4851-871C-127732E5EC44}" type="datetimeFigureOut">
               <a:rPr lang="en-US" smtClean="0"/>
-              <a:t>8/8/2021</a:t>
+              <a:t>3/5/2022</a:t>
             </a:fld>
             <a:endParaRPr lang="en-US"/>
           </a:p>
@@ -858,7 +864,7 @@
           <a:p>
             <a:fld id="{39841380-F30E-4851-871C-127732E5EC44}" type="datetimeFigureOut">
               <a:rPr lang="en-US" smtClean="0"/>
-              <a:t>8/8/2021</a:t>
+              <a:t>3/5/2022</a:t>
             </a:fld>
             <a:endParaRPr lang="en-US"/>
           </a:p>
@@ -1133,7 +1139,7 @@
           <a:p>
             <a:fld id="{39841380-F30E-4851-871C-127732E5EC44}" type="datetimeFigureOut">
               <a:rPr lang="en-US" smtClean="0"/>
-              <a:t>8/8/2021</a:t>
+              <a:t>3/5/2022</a:t>
             </a:fld>
             <a:endParaRPr lang="en-US"/>
           </a:p>
@@ -1398,7 +1404,7 @@
           <a:p>
             <a:fld id="{39841380-F30E-4851-871C-127732E5EC44}" type="datetimeFigureOut">
               <a:rPr lang="en-US" smtClean="0"/>
-              <a:t>8/8/2021</a:t>
+              <a:t>3/5/2022</a:t>
             </a:fld>
             <a:endParaRPr lang="en-US"/>
           </a:p>
@@ -1810,7 +1816,7 @@
           <a:p>
             <a:fld id="{39841380-F30E-4851-871C-127732E5EC44}" type="datetimeFigureOut">
               <a:rPr lang="en-US" smtClean="0"/>
-              <a:t>8/8/2021</a:t>
+              <a:t>3/5/2022</a:t>
             </a:fld>
             <a:endParaRPr lang="en-US"/>
           </a:p>
@@ -1951,7 +1957,7 @@
           <a:p>
             <a:fld id="{39841380-F30E-4851-871C-127732E5EC44}" type="datetimeFigureOut">
               <a:rPr lang="en-US" smtClean="0"/>
-              <a:t>8/8/2021</a:t>
+              <a:t>3/5/2022</a:t>
             </a:fld>
             <a:endParaRPr lang="en-US"/>
           </a:p>
@@ -2064,7 +2070,7 @@
           <a:p>
             <a:fld id="{39841380-F30E-4851-871C-127732E5EC44}" type="datetimeFigureOut">
               <a:rPr lang="en-US" smtClean="0"/>
-              <a:t>8/8/2021</a:t>
+              <a:t>3/5/2022</a:t>
             </a:fld>
             <a:endParaRPr lang="en-US"/>
           </a:p>
@@ -2375,7 +2381,7 @@
           <a:p>
             <a:fld id="{39841380-F30E-4851-871C-127732E5EC44}" type="datetimeFigureOut">
               <a:rPr lang="en-US" smtClean="0"/>
-              <a:t>8/8/2021</a:t>
+              <a:t>3/5/2022</a:t>
             </a:fld>
             <a:endParaRPr lang="en-US"/>
           </a:p>
@@ -2663,7 +2669,7 @@
           <a:p>
             <a:fld id="{39841380-F30E-4851-871C-127732E5EC44}" type="datetimeFigureOut">
               <a:rPr lang="en-US" smtClean="0"/>
-              <a:t>8/8/2021</a:t>
+              <a:t>3/5/2022</a:t>
             </a:fld>
             <a:endParaRPr lang="en-US"/>
           </a:p>
@@ -2904,7 +2910,7 @@
           <a:p>
             <a:fld id="{39841380-F30E-4851-871C-127732E5EC44}" type="datetimeFigureOut">
               <a:rPr lang="en-US" smtClean="0"/>
-              <a:t>8/8/2021</a:t>
+              <a:t>3/5/2022</a:t>
             </a:fld>
             <a:endParaRPr lang="en-US"/>
           </a:p>
@@ -3625,6 +3631,328 @@
 </p:sld>
 </file>
 
+<file path=ppt/slides/slide2.xml><?xml version="1.0" encoding="utf-8"?>
+<p:sld xmlns:a="http://schemas.openxmlformats.org/drawingml/2006/main" xmlns:r="http://schemas.openxmlformats.org/officeDocument/2006/relationships" xmlns:p="http://schemas.openxmlformats.org/presentationml/2006/main">
+  <p:cSld>
+    <p:spTree>
+      <p:nvGrpSpPr>
+        <p:cNvPr id="1" name=""/>
+        <p:cNvGrpSpPr/>
+        <p:nvPr/>
+      </p:nvGrpSpPr>
+      <p:grpSpPr>
+        <a:xfrm>
+          <a:off x="0" y="0"/>
+          <a:ext cx="0" cy="0"/>
+          <a:chOff x="0" y="0"/>
+          <a:chExt cx="0" cy="0"/>
+        </a:xfrm>
+      </p:grpSpPr>
+      <p:sp>
+        <p:nvSpPr>
+          <p:cNvPr id="4" name="Title 3">
+            <a:extLst>
+              <a:ext uri="{FF2B5EF4-FFF2-40B4-BE49-F238E27FC236}">
+                <a16:creationId xmlns:a16="http://schemas.microsoft.com/office/drawing/2014/main" id="{34163318-EFB7-4954-947F-FE5D2EBF5834}"/>
+              </a:ext>
+            </a:extLst>
+          </p:cNvPr>
+          <p:cNvSpPr>
+            <a:spLocks noGrp="1"/>
+          </p:cNvSpPr>
+          <p:nvPr>
+            <p:ph type="title"/>
+          </p:nvPr>
+        </p:nvSpPr>
+        <p:spPr/>
+        <p:txBody>
+          <a:bodyPr/>
+          <a:lstStyle/>
+          <a:p>
+            <a:r>
+              <a:rPr lang="en-US" dirty="0"/>
+              <a:t>Doji</a:t>
+            </a:r>
+          </a:p>
+        </p:txBody>
+      </p:sp>
+      <p:cxnSp>
+        <p:nvCxnSpPr>
+          <p:cNvPr id="6" name="Straight Connector 5">
+            <a:extLst>
+              <a:ext uri="{FF2B5EF4-FFF2-40B4-BE49-F238E27FC236}">
+                <a16:creationId xmlns:a16="http://schemas.microsoft.com/office/drawing/2014/main" id="{143DDC87-F100-4342-82B8-65DE1CD6C7CE}"/>
+              </a:ext>
+            </a:extLst>
+          </p:cNvPr>
+          <p:cNvCxnSpPr>
+            <a:cxnSpLocks/>
+          </p:cNvCxnSpPr>
+          <p:nvPr/>
+        </p:nvCxnSpPr>
+        <p:spPr>
+          <a:xfrm>
+            <a:off x="4800600" y="3148642"/>
+            <a:ext cx="0" cy="1017916"/>
+          </a:xfrm>
+          <a:prstGeom prst="line">
+            <a:avLst/>
+          </a:prstGeom>
+          <a:ln w="57150">
+            <a:solidFill>
+              <a:schemeClr val="accent6">
+                <a:lumMod val="75000"/>
+              </a:schemeClr>
+            </a:solidFill>
+          </a:ln>
+        </p:spPr>
+        <p:style>
+          <a:lnRef idx="1">
+            <a:schemeClr val="accent1"/>
+          </a:lnRef>
+          <a:fillRef idx="0">
+            <a:schemeClr val="accent1"/>
+          </a:fillRef>
+          <a:effectRef idx="0">
+            <a:schemeClr val="accent1"/>
+          </a:effectRef>
+          <a:fontRef idx="minor">
+            <a:schemeClr val="tx1"/>
+          </a:fontRef>
+        </p:style>
+      </p:cxnSp>
+      <p:sp>
+        <p:nvSpPr>
+          <p:cNvPr id="7" name="Rectangle 6">
+            <a:extLst>
+              <a:ext uri="{FF2B5EF4-FFF2-40B4-BE49-F238E27FC236}">
+                <a16:creationId xmlns:a16="http://schemas.microsoft.com/office/drawing/2014/main" id="{CA51E41A-1AC7-4DDF-A19F-AB43646240B7}"/>
+              </a:ext>
+            </a:extLst>
+          </p:cNvPr>
+          <p:cNvSpPr/>
+          <p:nvPr/>
+        </p:nvSpPr>
+        <p:spPr>
+          <a:xfrm>
+            <a:off x="4572000" y="3657916"/>
+            <a:ext cx="457200" cy="45719"/>
+          </a:xfrm>
+          <a:prstGeom prst="rect">
+            <a:avLst/>
+          </a:prstGeom>
+          <a:solidFill>
+            <a:schemeClr val="accent6">
+              <a:lumMod val="75000"/>
+            </a:schemeClr>
+          </a:solidFill>
+          <a:ln>
+            <a:noFill/>
+          </a:ln>
+        </p:spPr>
+        <p:style>
+          <a:lnRef idx="2">
+            <a:schemeClr val="accent1">
+              <a:shade val="50000"/>
+            </a:schemeClr>
+          </a:lnRef>
+          <a:fillRef idx="1">
+            <a:schemeClr val="accent1"/>
+          </a:fillRef>
+          <a:effectRef idx="0">
+            <a:schemeClr val="accent1"/>
+          </a:effectRef>
+          <a:fontRef idx="minor">
+            <a:schemeClr val="lt1"/>
+          </a:fontRef>
+        </p:style>
+        <p:txBody>
+          <a:bodyPr rtlCol="0" anchor="ctr"/>
+          <a:lstStyle/>
+          <a:p>
+            <a:pPr algn="ctr"/>
+            <a:endParaRPr lang="en-US"/>
+          </a:p>
+        </p:txBody>
+      </p:sp>
+      <p:cxnSp>
+        <p:nvCxnSpPr>
+          <p:cNvPr id="8" name="Straight Connector 7">
+            <a:extLst>
+              <a:ext uri="{FF2B5EF4-FFF2-40B4-BE49-F238E27FC236}">
+                <a16:creationId xmlns:a16="http://schemas.microsoft.com/office/drawing/2014/main" id="{931BF6D4-E8A8-47AA-A128-F3318BFCE8A4}"/>
+              </a:ext>
+            </a:extLst>
+          </p:cNvPr>
+          <p:cNvCxnSpPr/>
+          <p:nvPr/>
+        </p:nvCxnSpPr>
+        <p:spPr>
+          <a:xfrm>
+            <a:off x="6172200" y="2286000"/>
+            <a:ext cx="0" cy="2743200"/>
+          </a:xfrm>
+          <a:prstGeom prst="line">
+            <a:avLst/>
+          </a:prstGeom>
+          <a:ln w="57150">
+            <a:solidFill>
+              <a:srgbClr val="C00000"/>
+            </a:solidFill>
+          </a:ln>
+        </p:spPr>
+        <p:style>
+          <a:lnRef idx="1">
+            <a:schemeClr val="accent1"/>
+          </a:lnRef>
+          <a:fillRef idx="0">
+            <a:schemeClr val="accent1"/>
+          </a:fillRef>
+          <a:effectRef idx="0">
+            <a:schemeClr val="accent1"/>
+          </a:effectRef>
+          <a:fontRef idx="minor">
+            <a:schemeClr val="tx1"/>
+          </a:fontRef>
+        </p:style>
+      </p:cxnSp>
+      <p:sp>
+        <p:nvSpPr>
+          <p:cNvPr id="9" name="Rectangle 8">
+            <a:extLst>
+              <a:ext uri="{FF2B5EF4-FFF2-40B4-BE49-F238E27FC236}">
+                <a16:creationId xmlns:a16="http://schemas.microsoft.com/office/drawing/2014/main" id="{36339A97-5DA3-4B05-8BB7-4CDCB3942D6B}"/>
+              </a:ext>
+            </a:extLst>
+          </p:cNvPr>
+          <p:cNvSpPr/>
+          <p:nvPr/>
+        </p:nvSpPr>
+        <p:spPr>
+          <a:xfrm>
+            <a:off x="5943600" y="3657916"/>
+            <a:ext cx="457200" cy="45720"/>
+          </a:xfrm>
+          <a:prstGeom prst="rect">
+            <a:avLst/>
+          </a:prstGeom>
+          <a:solidFill>
+            <a:srgbClr val="C00000"/>
+          </a:solidFill>
+          <a:ln>
+            <a:noFill/>
+          </a:ln>
+        </p:spPr>
+        <p:style>
+          <a:lnRef idx="2">
+            <a:schemeClr val="accent1">
+              <a:shade val="50000"/>
+            </a:schemeClr>
+          </a:lnRef>
+          <a:fillRef idx="1">
+            <a:schemeClr val="accent1"/>
+          </a:fillRef>
+          <a:effectRef idx="0">
+            <a:schemeClr val="accent1"/>
+          </a:effectRef>
+          <a:fontRef idx="minor">
+            <a:schemeClr val="lt1"/>
+          </a:fontRef>
+        </p:style>
+        <p:txBody>
+          <a:bodyPr rtlCol="0" anchor="ctr"/>
+          <a:lstStyle/>
+          <a:p>
+            <a:pPr algn="ctr"/>
+            <a:endParaRPr lang="en-US"/>
+          </a:p>
+        </p:txBody>
+      </p:sp>
+      <p:sp>
+        <p:nvSpPr>
+          <p:cNvPr id="10" name="TextBox 9">
+            <a:extLst>
+              <a:ext uri="{FF2B5EF4-FFF2-40B4-BE49-F238E27FC236}">
+                <a16:creationId xmlns:a16="http://schemas.microsoft.com/office/drawing/2014/main" id="{ED062664-9A3D-4B37-9BBF-5F9043914BB6}"/>
+              </a:ext>
+            </a:extLst>
+          </p:cNvPr>
+          <p:cNvSpPr txBox="1"/>
+          <p:nvPr/>
+        </p:nvSpPr>
+        <p:spPr>
+          <a:xfrm>
+            <a:off x="4343400" y="4262818"/>
+            <a:ext cx="914400" cy="276999"/>
+          </a:xfrm>
+          <a:prstGeom prst="rect">
+            <a:avLst/>
+          </a:prstGeom>
+          <a:noFill/>
+        </p:spPr>
+        <p:txBody>
+          <a:bodyPr wrap="square" lIns="0" tIns="0" rIns="0" bIns="0" rtlCol="0">
+            <a:spAutoFit/>
+          </a:bodyPr>
+          <a:lstStyle/>
+          <a:p>
+            <a:pPr algn="ctr"/>
+            <a:r>
+              <a:rPr lang="en-US" dirty="0"/>
+              <a:t>Doji</a:t>
+            </a:r>
+          </a:p>
+        </p:txBody>
+      </p:sp>
+      <p:sp>
+        <p:nvSpPr>
+          <p:cNvPr id="11" name="TextBox 10">
+            <a:extLst>
+              <a:ext uri="{FF2B5EF4-FFF2-40B4-BE49-F238E27FC236}">
+                <a16:creationId xmlns:a16="http://schemas.microsoft.com/office/drawing/2014/main" id="{07F457D0-F438-4D3D-BAC8-691D6AB68E1A}"/>
+              </a:ext>
+            </a:extLst>
+          </p:cNvPr>
+          <p:cNvSpPr txBox="1"/>
+          <p:nvPr/>
+        </p:nvSpPr>
+        <p:spPr>
+          <a:xfrm>
+            <a:off x="5557838" y="5204073"/>
+            <a:ext cx="1228723" cy="276999"/>
+          </a:xfrm>
+          <a:prstGeom prst="rect">
+            <a:avLst/>
+          </a:prstGeom>
+          <a:noFill/>
+        </p:spPr>
+        <p:txBody>
+          <a:bodyPr wrap="square" lIns="0" tIns="0" rIns="0" bIns="0" rtlCol="0">
+            <a:spAutoFit/>
+          </a:bodyPr>
+          <a:lstStyle/>
+          <a:p>
+            <a:pPr algn="ctr"/>
+            <a:r>
+              <a:rPr lang="en-US" dirty="0"/>
+              <a:t>Long-legged</a:t>
+            </a:r>
+          </a:p>
+        </p:txBody>
+      </p:sp>
+    </p:spTree>
+    <p:extLst>
+      <p:ext uri="{BB962C8B-B14F-4D97-AF65-F5344CB8AC3E}">
+        <p14:creationId xmlns:p14="http://schemas.microsoft.com/office/powerpoint/2010/main" val="152903823"/>
+      </p:ext>
+    </p:extLst>
+  </p:cSld>
+  <p:clrMapOvr>
+    <a:masterClrMapping/>
+  </p:clrMapOvr>
+</p:sld>
+</file>
+
 <file path=ppt/theme/theme1.xml><?xml version="1.0" encoding="utf-8"?>
 <a:theme xmlns:a="http://schemas.openxmlformats.org/drawingml/2006/main" name="Office Theme">
   <a:themeElements>

</xml_diff>